<commit_message>
11-jQuery tasks + presentation
</commit_message>
<xml_diff>
--- a/11-jQuery.pptx
+++ b/11-jQuery.pptx
@@ -248,7 +248,7 @@
           <a:p>
             <a:fld id="{2E054F57-E93D-4CC3-8A27-2F256E70BB98}" type="datetimeFigureOut">
               <a:rPr lang="en-US" smtClean="0"/>
-              <a:t>09 Sep 15</a:t>
+              <a:t>11 Sep 15</a:t>
             </a:fld>
             <a:endParaRPr lang="en-US"/>
           </a:p>
@@ -697,7 +697,7 @@
           <a:p>
             <a:fld id="{3EA744D9-3FBE-48D8-BF2A-85DF203E4D20}" type="datetimeFigureOut">
               <a:rPr lang="bg-BG" smtClean="0"/>
-              <a:t>9.9.2015 г.</a:t>
+              <a:t>11.9.2015 г.</a:t>
             </a:fld>
             <a:endParaRPr lang="bg-BG"/>
           </a:p>
@@ -867,7 +867,7 @@
           <a:p>
             <a:fld id="{3EA744D9-3FBE-48D8-BF2A-85DF203E4D20}" type="datetimeFigureOut">
               <a:rPr lang="bg-BG" smtClean="0"/>
-              <a:t>9.9.2015 г.</a:t>
+              <a:t>11.9.2015 г.</a:t>
             </a:fld>
             <a:endParaRPr lang="bg-BG"/>
           </a:p>
@@ -1047,7 +1047,7 @@
           <a:p>
             <a:fld id="{3EA744D9-3FBE-48D8-BF2A-85DF203E4D20}" type="datetimeFigureOut">
               <a:rPr lang="bg-BG" smtClean="0"/>
-              <a:t>9.9.2015 г.</a:t>
+              <a:t>11.9.2015 г.</a:t>
             </a:fld>
             <a:endParaRPr lang="bg-BG"/>
           </a:p>
@@ -1217,7 +1217,7 @@
           <a:p>
             <a:fld id="{3EA744D9-3FBE-48D8-BF2A-85DF203E4D20}" type="datetimeFigureOut">
               <a:rPr lang="bg-BG" smtClean="0"/>
-              <a:t>9.9.2015 г.</a:t>
+              <a:t>11.9.2015 г.</a:t>
             </a:fld>
             <a:endParaRPr lang="bg-BG"/>
           </a:p>
@@ -1463,7 +1463,7 @@
           <a:p>
             <a:fld id="{3EA744D9-3FBE-48D8-BF2A-85DF203E4D20}" type="datetimeFigureOut">
               <a:rPr lang="bg-BG" smtClean="0"/>
-              <a:t>9.9.2015 г.</a:t>
+              <a:t>11.9.2015 г.</a:t>
             </a:fld>
             <a:endParaRPr lang="bg-BG"/>
           </a:p>
@@ -1751,7 +1751,7 @@
           <a:p>
             <a:fld id="{3EA744D9-3FBE-48D8-BF2A-85DF203E4D20}" type="datetimeFigureOut">
               <a:rPr lang="bg-BG" smtClean="0"/>
-              <a:t>9.9.2015 г.</a:t>
+              <a:t>11.9.2015 г.</a:t>
             </a:fld>
             <a:endParaRPr lang="bg-BG"/>
           </a:p>
@@ -2173,7 +2173,7 @@
           <a:p>
             <a:fld id="{3EA744D9-3FBE-48D8-BF2A-85DF203E4D20}" type="datetimeFigureOut">
               <a:rPr lang="bg-BG" smtClean="0"/>
-              <a:t>9.9.2015 г.</a:t>
+              <a:t>11.9.2015 г.</a:t>
             </a:fld>
             <a:endParaRPr lang="bg-BG"/>
           </a:p>
@@ -2291,7 +2291,7 @@
           <a:p>
             <a:fld id="{3EA744D9-3FBE-48D8-BF2A-85DF203E4D20}" type="datetimeFigureOut">
               <a:rPr lang="bg-BG" smtClean="0"/>
-              <a:t>9.9.2015 г.</a:t>
+              <a:t>11.9.2015 г.</a:t>
             </a:fld>
             <a:endParaRPr lang="bg-BG"/>
           </a:p>
@@ -2386,7 +2386,7 @@
           <a:p>
             <a:fld id="{3EA744D9-3FBE-48D8-BF2A-85DF203E4D20}" type="datetimeFigureOut">
               <a:rPr lang="bg-BG" smtClean="0"/>
-              <a:t>9.9.2015 г.</a:t>
+              <a:t>11.9.2015 г.</a:t>
             </a:fld>
             <a:endParaRPr lang="bg-BG"/>
           </a:p>
@@ -2663,7 +2663,7 @@
           <a:p>
             <a:fld id="{3EA744D9-3FBE-48D8-BF2A-85DF203E4D20}" type="datetimeFigureOut">
               <a:rPr lang="bg-BG" smtClean="0"/>
-              <a:t>9.9.2015 г.</a:t>
+              <a:t>11.9.2015 г.</a:t>
             </a:fld>
             <a:endParaRPr lang="bg-BG"/>
           </a:p>
@@ -2916,7 +2916,7 @@
           <a:p>
             <a:fld id="{3EA744D9-3FBE-48D8-BF2A-85DF203E4D20}" type="datetimeFigureOut">
               <a:rPr lang="bg-BG" smtClean="0"/>
-              <a:t>9.9.2015 г.</a:t>
+              <a:t>11.9.2015 г.</a:t>
             </a:fld>
             <a:endParaRPr lang="bg-BG"/>
           </a:p>
@@ -3138,7 +3138,7 @@
           <a:p>
             <a:fld id="{3EA744D9-3FBE-48D8-BF2A-85DF203E4D20}" type="datetimeFigureOut">
               <a:rPr lang="bg-BG" smtClean="0"/>
-              <a:t>9.9.2015 г.</a:t>
+              <a:t>11.9.2015 г.</a:t>
             </a:fld>
             <a:endParaRPr lang="bg-BG"/>
           </a:p>
@@ -5236,7 +5236,17 @@
                 <a:latin typeface="Courier New" panose="02070309020205020404" pitchFamily="49" charset="0"/>
                 <a:cs typeface="Courier New" panose="02070309020205020404" pitchFamily="49" charset="0"/>
               </a:rPr>
-              <a:t>$(‘div’).animate({top: ‘200px</a:t>
+              <a:t>$(‘div’).animate({top: ‘200px’}, 500).</a:t>
+            </a:r>
+            <a:r>
+              <a:rPr lang="en-US" sz="1800" dirty="0" err="1" smtClean="0">
+                <a:solidFill>
+                  <a:schemeClr val="bg1"/>
+                </a:solidFill>
+                <a:latin typeface="Courier New" panose="02070309020205020404" pitchFamily="49" charset="0"/>
+                <a:cs typeface="Courier New" panose="02070309020205020404" pitchFamily="49" charset="0"/>
+              </a:rPr>
+              <a:t>slideUp</a:t>
             </a:r>
             <a:r>
               <a:rPr lang="en-US" sz="1800" dirty="0" smtClean="0">
@@ -5246,7 +5256,7 @@
                 <a:latin typeface="Courier New" panose="02070309020205020404" pitchFamily="49" charset="0"/>
                 <a:cs typeface="Courier New" panose="02070309020205020404" pitchFamily="49" charset="0"/>
               </a:rPr>
-              <a:t>’}, 500).</a:t>
+              <a:t>(1000).</a:t>
             </a:r>
             <a:r>
               <a:rPr lang="en-US" sz="1800" dirty="0" err="1" smtClean="0">
@@ -5256,7 +5266,7 @@
                 <a:latin typeface="Courier New" panose="02070309020205020404" pitchFamily="49" charset="0"/>
                 <a:cs typeface="Courier New" panose="02070309020205020404" pitchFamily="49" charset="0"/>
               </a:rPr>
-              <a:t>slideUp</a:t>
+              <a:t>slideDown</a:t>
             </a:r>
             <a:r>
               <a:rPr lang="en-US" sz="1800" dirty="0" smtClean="0">
@@ -5266,47 +5276,7 @@
                 <a:latin typeface="Courier New" panose="02070309020205020404" pitchFamily="49" charset="0"/>
                 <a:cs typeface="Courier New" panose="02070309020205020404" pitchFamily="49" charset="0"/>
               </a:rPr>
-              <a:t>(1000</a:t>
-            </a:r>
-            <a:r>
-              <a:rPr lang="en-US" sz="1800" dirty="0" smtClean="0">
-                <a:solidFill>
-                  <a:schemeClr val="bg1"/>
-                </a:solidFill>
-                <a:latin typeface="Courier New" panose="02070309020205020404" pitchFamily="49" charset="0"/>
-                <a:cs typeface="Courier New" panose="02070309020205020404" pitchFamily="49" charset="0"/>
-              </a:rPr>
-              <a:t>).</a:t>
-            </a:r>
-            <a:r>
-              <a:rPr lang="en-US" sz="1800" dirty="0" err="1" smtClean="0">
-                <a:solidFill>
-                  <a:schemeClr val="bg1"/>
-                </a:solidFill>
-                <a:latin typeface="Courier New" panose="02070309020205020404" pitchFamily="49" charset="0"/>
-                <a:cs typeface="Courier New" panose="02070309020205020404" pitchFamily="49" charset="0"/>
-              </a:rPr>
-              <a:t>slideDown</a:t>
-            </a:r>
-            <a:r>
-              <a:rPr lang="en-US" sz="1800" dirty="0" smtClean="0">
-                <a:solidFill>
-                  <a:schemeClr val="bg1"/>
-                </a:solidFill>
-                <a:latin typeface="Courier New" panose="02070309020205020404" pitchFamily="49" charset="0"/>
-                <a:cs typeface="Courier New" panose="02070309020205020404" pitchFamily="49" charset="0"/>
-              </a:rPr>
-              <a:t>(2000</a:t>
-            </a:r>
-            <a:r>
-              <a:rPr lang="en-US" sz="1800" dirty="0" smtClean="0">
-                <a:solidFill>
-                  <a:schemeClr val="bg1"/>
-                </a:solidFill>
-                <a:latin typeface="Courier New" panose="02070309020205020404" pitchFamily="49" charset="0"/>
-                <a:cs typeface="Courier New" panose="02070309020205020404" pitchFamily="49" charset="0"/>
-              </a:rPr>
-              <a:t>);</a:t>
+              <a:t>(2000);</a:t>
             </a:r>
           </a:p>
           <a:p>
@@ -5777,25 +5747,8 @@
                 <a:latin typeface="Courier New" panose="02070309020205020404" pitchFamily="49" charset="0"/>
                 <a:cs typeface="Courier New" panose="02070309020205020404" pitchFamily="49" charset="0"/>
               </a:rPr>
-              <a:t>стойност</a:t>
-            </a:r>
-            <a:r>
-              <a:rPr lang="bg-BG" sz="1800" dirty="0" smtClean="0">
-                <a:solidFill>
-                  <a:schemeClr val="bg1"/>
-                </a:solidFill>
-                <a:latin typeface="Courier New" panose="02070309020205020404" pitchFamily="49" charset="0"/>
-                <a:cs typeface="Courier New" panose="02070309020205020404" pitchFamily="49" charset="0"/>
-              </a:rPr>
-              <a:t>‘</a:t>
-            </a:r>
-            <a:endParaRPr lang="bg-BG" sz="1800" dirty="0" smtClean="0">
-              <a:solidFill>
-                <a:schemeClr val="bg1"/>
-              </a:solidFill>
-              <a:latin typeface="Courier New" panose="02070309020205020404" pitchFamily="49" charset="0"/>
-              <a:cs typeface="Courier New" panose="02070309020205020404" pitchFamily="49" charset="0"/>
-            </a:endParaRPr>
+              <a:t>стойност‘</a:t>
+            </a:r>
           </a:p>
           <a:p>
             <a:pPr marL="0" indent="0">
@@ -6224,17 +6177,27 @@
                 <a:latin typeface="+mj-lt"/>
                 <a:cs typeface="Courier New" panose="02070309020205020404" pitchFamily="49" charset="0"/>
               </a:rPr>
-              <a:t> метода, можем да вземем текстовото съдържание на елемента, който достъпваме(ако има такова) или на първия му </a:t>
-            </a:r>
-            <a:r>
-              <a:rPr lang="en-US" sz="2500" dirty="0" smtClean="0">
-                <a:solidFill>
-                  <a:schemeClr val="bg1"/>
-                </a:solidFill>
-                <a:latin typeface="+mj-lt"/>
-                <a:cs typeface="Courier New" panose="02070309020205020404" pitchFamily="49" charset="0"/>
-              </a:rPr>
-              <a:t>child.</a:t>
+              <a:t> метода, можем да вземем текстовото съдържание на елемента, който достъпваме(ако има </a:t>
+            </a:r>
+            <a:r>
+              <a:rPr lang="bg-BG" sz="2500" dirty="0" smtClean="0">
+                <a:solidFill>
+                  <a:schemeClr val="bg1"/>
+                </a:solidFill>
+                <a:latin typeface="+mj-lt"/>
+                <a:cs typeface="Courier New" panose="02070309020205020404" pitchFamily="49" charset="0"/>
+              </a:rPr>
+              <a:t>такова</a:t>
+            </a:r>
+            <a:r>
+              <a:rPr lang="en-US" sz="2500" smtClean="0">
+                <a:solidFill>
+                  <a:schemeClr val="bg1"/>
+                </a:solidFill>
+                <a:latin typeface="+mj-lt"/>
+                <a:cs typeface="Courier New" panose="02070309020205020404" pitchFamily="49" charset="0"/>
+              </a:rPr>
+              <a:t>).</a:t>
             </a:r>
             <a:endParaRPr lang="bg-BG" sz="2500" dirty="0" smtClean="0">
               <a:solidFill>
@@ -10218,65 +10181,28 @@
                   </a:schemeClr>
                 </a:solidFill>
               </a:rPr>
-              <a:t>събитие на елемент по избор и </a:t>
-            </a:r>
-            <a:r>
-              <a:rPr lang="bg-BG" sz="2000" b="1" dirty="0" smtClean="0">
+              <a:t>събитие на елемент по избор и скрива</a:t>
+            </a:r>
+            <a:r>
+              <a:rPr lang="en-US" sz="2000" b="1" dirty="0" smtClean="0">
                 <a:solidFill>
                   <a:schemeClr val="bg1">
                     <a:lumMod val="95000"/>
                   </a:schemeClr>
                 </a:solidFill>
               </a:rPr>
-              <a:t>скрива</a:t>
-            </a:r>
-            <a:r>
-              <a:rPr lang="en-US" sz="2000" b="1" dirty="0" smtClean="0">
+              <a:t> </a:t>
+            </a:r>
+            <a:r>
+              <a:rPr lang="bg-BG" sz="2000" b="1" dirty="0" smtClean="0">
                 <a:solidFill>
                   <a:schemeClr val="bg1">
                     <a:lumMod val="95000"/>
                   </a:schemeClr>
                 </a:solidFill>
               </a:rPr>
-              <a:t> </a:t>
-            </a:r>
-            <a:r>
-              <a:rPr lang="bg-BG" sz="2000" b="1" dirty="0" smtClean="0">
-                <a:solidFill>
-                  <a:schemeClr val="bg1">
-                    <a:lumMod val="95000"/>
-                  </a:schemeClr>
-                </a:solidFill>
-              </a:rPr>
-              <a:t>или показва друг </a:t>
-            </a:r>
-            <a:r>
-              <a:rPr lang="bg-BG" sz="2000" b="1" dirty="0" smtClean="0">
-                <a:solidFill>
-                  <a:schemeClr val="bg1">
-                    <a:lumMod val="95000"/>
-                  </a:schemeClr>
-                </a:solidFill>
-              </a:rPr>
-              <a:t>елемент(отново по избор</a:t>
-            </a:r>
-            <a:r>
-              <a:rPr lang="bg-BG" sz="2000" b="1" dirty="0" smtClean="0">
-                <a:solidFill>
-                  <a:schemeClr val="bg1">
-                    <a:lumMod val="95000"/>
-                  </a:schemeClr>
-                </a:solidFill>
-              </a:rPr>
-              <a:t>) съответно ако елементът е показан или скрит.</a:t>
-            </a:r>
-            <a:endParaRPr lang="bg-BG" sz="2000" b="1" dirty="0" smtClean="0">
-              <a:solidFill>
-                <a:schemeClr val="bg1">
-                  <a:lumMod val="95000"/>
-                </a:schemeClr>
-              </a:solidFill>
-            </a:endParaRPr>
+              <a:t>или показва друг елемент(отново по избор) съответно ако елементът е показан или скрит.</a:t>
+            </a:r>
           </a:p>
           <a:p>
             <a:pPr marL="457200" indent="-457200">

</xml_diff>